<commit_message>
Lots plus CHM212 record
</commit_message>
<xml_diff>
--- a/MS11/Sem4/Meet1/MS11_meet1.pptx
+++ b/MS11/Sem4/Meet1/MS11_meet1.pptx
@@ -4625,7 +4625,7 @@
           <a:p>
             <a:fld id="{A8224893-DBDA-4BFA-9CE1-4BFE7CD0F8CF}" type="datetime1">
               <a:rPr lang="en-US" smtClean="0"/>
-              <a:t>1/13/2013</a:t>
+              <a:t>1/15/2013</a:t>
             </a:fld>
             <a:endParaRPr lang="en-US"/>
           </a:p>
@@ -4805,7 +4805,7 @@
           <a:p>
             <a:fld id="{5F4E5243-F52A-4D37-9694-EB26C6C31910}" type="datetime1">
               <a:rPr lang="en-US" smtClean="0"/>
-              <a:t>1/13/2013</a:t>
+              <a:t>1/15/2013</a:t>
             </a:fld>
             <a:endParaRPr lang="en-US"/>
           </a:p>
@@ -4995,7 +4995,7 @@
           <a:p>
             <a:fld id="{3A77B6E1-634A-48DC-9E8B-D894023267EF}" type="datetime1">
               <a:rPr lang="en-US" smtClean="0"/>
-              <a:t>1/13/2013</a:t>
+              <a:t>1/15/2013</a:t>
             </a:fld>
             <a:endParaRPr lang="en-US"/>
           </a:p>
@@ -5208,7 +5208,7 @@
           <a:p>
             <a:fld id="{A8224893-DBDA-4BFA-9CE1-4BFE7CD0F8CF}" type="datetime1">
               <a:rPr lang="en-US" smtClean="0"/>
-              <a:t>1/13/2013</a:t>
+              <a:t>1/15/2013</a:t>
             </a:fld>
             <a:endParaRPr lang="en-US"/>
           </a:p>
@@ -5388,7 +5388,7 @@
           <a:p>
             <a:fld id="{7B2D3E9E-A95C-48F2-B4BF-A71542E0BE9A}" type="datetime1">
               <a:rPr lang="en-US" smtClean="0"/>
-              <a:t>1/13/2013</a:t>
+              <a:t>1/15/2013</a:t>
             </a:fld>
             <a:endParaRPr lang="en-US"/>
           </a:p>
@@ -5649,7 +5649,7 @@
           <a:p>
             <a:fld id="{A50F84E2-2D7A-43CF-AC90-352A289A783A}" type="datetime1">
               <a:rPr lang="en-US" smtClean="0"/>
-              <a:t>1/13/2013</a:t>
+              <a:t>1/15/2013</a:t>
             </a:fld>
             <a:endParaRPr lang="en-US"/>
           </a:p>
@@ -5891,7 +5891,7 @@
           <a:p>
             <a:fld id="{F12952B5-7A2F-4CC8-B7CE-9234E21C2837}" type="datetime1">
               <a:rPr lang="en-US" smtClean="0"/>
-              <a:t>1/13/2013</a:t>
+              <a:t>1/15/2013</a:t>
             </a:fld>
             <a:endParaRPr lang="en-US"/>
           </a:p>
@@ -6248,7 +6248,7 @@
           <a:p>
             <a:fld id="{CE1DA07A-9201-4B4B-BAF2-015AFA30F520}" type="datetime1">
               <a:rPr lang="en-US" smtClean="0"/>
-              <a:t>1/13/2013</a:t>
+              <a:t>1/15/2013</a:t>
             </a:fld>
             <a:endParaRPr lang="en-US"/>
           </a:p>
@@ -6376,7 +6376,7 @@
           <a:p>
             <a:fld id="{73D7E00A-486F-4252-8B1D-E32645521F49}" type="datetime1">
               <a:rPr lang="en-US" smtClean="0"/>
-              <a:t>1/13/2013</a:t>
+              <a:t>1/15/2013</a:t>
             </a:fld>
             <a:endParaRPr lang="en-US"/>
           </a:p>
@@ -6504,7 +6504,7 @@
           <a:p>
             <a:fld id="{8DDF5F92-E675-4B36-9A60-69A962A68675}" type="datetime1">
               <a:rPr lang="en-US" smtClean="0"/>
-              <a:t>1/13/2013</a:t>
+              <a:t>1/15/2013</a:t>
             </a:fld>
             <a:endParaRPr lang="en-US"/>
           </a:p>
@@ -6798,7 +6798,7 @@
           <a:p>
             <a:fld id="{AF6E2C9B-5FA2-460D-9BE7-B0812FC2A6FF}" type="datetime1">
               <a:rPr lang="en-US" smtClean="0"/>
-              <a:t>1/13/2013</a:t>
+              <a:t>1/15/2013</a:t>
             </a:fld>
             <a:endParaRPr lang="en-US"/>
           </a:p>
@@ -6978,7 +6978,7 @@
           <a:p>
             <a:fld id="{7B2D3E9E-A95C-48F2-B4BF-A71542E0BE9A}" type="datetime1">
               <a:rPr lang="en-US" smtClean="0"/>
-              <a:t>1/13/2013</a:t>
+              <a:t>1/15/2013</a:t>
             </a:fld>
             <a:endParaRPr lang="en-US"/>
           </a:p>
@@ -7252,7 +7252,7 @@
           <a:p>
             <a:fld id="{1D374940-A916-4C8B-9648-02A2D3898F9E}" type="datetime1">
               <a:rPr lang="en-US" smtClean="0"/>
-              <a:t>1/13/2013</a:t>
+              <a:t>1/15/2013</a:t>
             </a:fld>
             <a:endParaRPr lang="en-US"/>
           </a:p>
@@ -7432,7 +7432,7 @@
           <a:p>
             <a:fld id="{5F4E5243-F52A-4D37-9694-EB26C6C31910}" type="datetime1">
               <a:rPr lang="en-US" smtClean="0"/>
-              <a:t>1/13/2013</a:t>
+              <a:t>1/15/2013</a:t>
             </a:fld>
             <a:endParaRPr lang="en-US"/>
           </a:p>
@@ -7622,7 +7622,7 @@
           <a:p>
             <a:fld id="{3A77B6E1-634A-48DC-9E8B-D894023267EF}" type="datetime1">
               <a:rPr lang="en-US" smtClean="0"/>
-              <a:t>1/13/2013</a:t>
+              <a:t>1/15/2013</a:t>
             </a:fld>
             <a:endParaRPr lang="en-US"/>
           </a:p>
@@ -7824,7 +7824,7 @@
           <a:p>
             <a:fld id="{A50F84E2-2D7A-43CF-AC90-352A289A783A}" type="datetime1">
               <a:rPr lang="en-US" smtClean="0"/>
-              <a:t>1/13/2013</a:t>
+              <a:t>1/15/2013</a:t>
             </a:fld>
             <a:endParaRPr lang="en-US"/>
           </a:p>
@@ -8122,7 +8122,7 @@
           <a:p>
             <a:fld id="{F12952B5-7A2F-4CC8-B7CE-9234E21C2837}" type="datetime1">
               <a:rPr lang="en-US" smtClean="0"/>
-              <a:t>1/13/2013</a:t>
+              <a:t>1/15/2013</a:t>
             </a:fld>
             <a:endParaRPr lang="en-US"/>
           </a:p>
@@ -8555,7 +8555,7 @@
           <a:p>
             <a:fld id="{CE1DA07A-9201-4B4B-BAF2-015AFA30F520}" type="datetime1">
               <a:rPr lang="en-US" smtClean="0"/>
-              <a:t>1/13/2013</a:t>
+              <a:t>1/15/2013</a:t>
             </a:fld>
             <a:endParaRPr lang="en-US"/>
           </a:p>
@@ -8683,7 +8683,7 @@
           <a:p>
             <a:fld id="{73D7E00A-486F-4252-8B1D-E32645521F49}" type="datetime1">
               <a:rPr lang="en-US" smtClean="0"/>
-              <a:t>1/13/2013</a:t>
+              <a:t>1/15/2013</a:t>
             </a:fld>
             <a:endParaRPr lang="en-US"/>
           </a:p>
@@ -8788,7 +8788,7 @@
           <a:p>
             <a:fld id="{8DDF5F92-E675-4B36-9A60-69A962A68675}" type="datetime1">
               <a:rPr lang="en-US" smtClean="0"/>
-              <a:t>1/13/2013</a:t>
+              <a:t>1/15/2013</a:t>
             </a:fld>
             <a:endParaRPr lang="en-US"/>
           </a:p>
@@ -9075,7 +9075,7 @@
           <a:p>
             <a:fld id="{AF6E2C9B-5FA2-460D-9BE7-B0812FC2A6FF}" type="datetime1">
               <a:rPr lang="en-US" smtClean="0"/>
-              <a:t>1/13/2013</a:t>
+              <a:t>1/15/2013</a:t>
             </a:fld>
             <a:endParaRPr lang="en-US"/>
           </a:p>
@@ -9338,7 +9338,7 @@
           <a:p>
             <a:fld id="{1D374940-A916-4C8B-9648-02A2D3898F9E}" type="datetime1">
               <a:rPr lang="en-US" smtClean="0"/>
-              <a:t>1/13/2013</a:t>
+              <a:t>1/15/2013</a:t>
             </a:fld>
             <a:endParaRPr lang="en-US"/>
           </a:p>
@@ -9561,7 +9561,7 @@
           <a:p>
             <a:fld id="{5586B75A-687E-405C-8A0B-8D00578BA2C3}" type="datetime1">
               <a:rPr lang="en-US" smtClean="0"/>
-              <a:t>1/13/2013</a:t>
+              <a:t>1/15/2013</a:t>
             </a:fld>
             <a:endParaRPr lang="en-US"/>
           </a:p>
@@ -10110,7 +10110,7 @@
           <a:p>
             <a:fld id="{5586B75A-687E-405C-8A0B-8D00578BA2C3}" type="datetime1">
               <a:rPr lang="en-US" smtClean="0"/>
-              <a:t>1/13/2013</a:t>
+              <a:t>1/15/2013</a:t>
             </a:fld>
             <a:endParaRPr lang="en-US"/>
           </a:p>
@@ -10996,7 +10996,7 @@
           <a:p>
             <a:fld id="{B11D738E-8962-435F-8C43-147B8DD7E819}" type="datetime1">
               <a:rPr lang="en-US" smtClean="0"/>
-              <a:t>1/13/2013</a:t>
+              <a:t>1/15/2013</a:t>
             </a:fld>
             <a:endParaRPr lang="en-US"/>
           </a:p>
@@ -11342,7 +11342,15 @@
           <a:p>
             <a:r>
               <a:rPr lang="en-US" dirty="0" smtClean="0"/>
-              <a:t>You’re advised to use discretion.</a:t>
+              <a:t>Viewer discretion is </a:t>
+            </a:r>
+            <a:r>
+              <a:rPr lang="en-US" dirty="0" err="1" smtClean="0"/>
+              <a:t>adviced</a:t>
+            </a:r>
+            <a:r>
+              <a:rPr lang="en-US" dirty="0" smtClean="0"/>
+              <a:t>.</a:t>
             </a:r>
             <a:endParaRPr lang="en-GB" dirty="0"/>
           </a:p>
@@ -11592,7 +11600,15 @@
             <a:pPr lvl="1"/>
             <a:r>
               <a:rPr lang="en-US" dirty="0" smtClean="0"/>
-              <a:t>Opportunity Cell Meet (near 100+% turnout, within the first 5 minutes, with pens!)</a:t>
+              <a:t>Opportunity Cell Meet (near </a:t>
+            </a:r>
+            <a:r>
+              <a:rPr lang="en-US" dirty="0" smtClean="0"/>
+              <a:t>100% </a:t>
+            </a:r>
+            <a:r>
+              <a:rPr lang="en-US" dirty="0" smtClean="0"/>
+              <a:t>turnout, within the first 5 minutes, with pens!)</a:t>
             </a:r>
           </a:p>
           <a:p>
@@ -11925,6 +11941,14 @@
             <a:r>
               <a:rPr lang="en-US" dirty="0" err="1" smtClean="0"/>
               <a:t>Yashpal</a:t>
+            </a:r>
+            <a:r>
+              <a:rPr lang="en-US" dirty="0" smtClean="0"/>
+              <a:t> (and now) </a:t>
+            </a:r>
+            <a:r>
+              <a:rPr lang="en-US" dirty="0" err="1" smtClean="0"/>
+              <a:t>Neha</a:t>
             </a:r>
             <a:endParaRPr lang="en-US" dirty="0" smtClean="0"/>
           </a:p>

</xml_diff>

<commit_message>
After a long time
</commit_message>
<xml_diff>
--- a/MS11/Sem4/Meet1/MS11_meet1.pptx
+++ b/MS11/Sem4/Meet1/MS11_meet1.pptx
@@ -1679,1209 +1679,6 @@
       <dsp:cNvGrpSpPr/>
     </dsp:nvGrpSpPr>
     <dsp:grpSpPr/>
-    <dsp:sp modelId="{D6481CC8-23A1-4667-BB67-0D87B7F55B58}">
-      <dsp:nvSpPr>
-        <dsp:cNvPr id="0" name=""/>
-        <dsp:cNvSpPr/>
-      </dsp:nvSpPr>
-      <dsp:spPr>
-        <a:xfrm>
-          <a:off x="1654" y="1772208"/>
-          <a:ext cx="1246407" cy="623203"/>
-        </a:xfrm>
-        <a:prstGeom prst="roundRect">
-          <a:avLst>
-            <a:gd name="adj" fmla="val 10000"/>
-          </a:avLst>
-        </a:prstGeom>
-        <a:solidFill>
-          <a:schemeClr val="accent1">
-            <a:hueOff val="0"/>
-            <a:satOff val="0"/>
-            <a:lumOff val="0"/>
-            <a:alphaOff val="0"/>
-          </a:schemeClr>
-        </a:solidFill>
-        <a:ln w="12700" cap="flat" cmpd="sng" algn="ctr">
-          <a:solidFill>
-            <a:schemeClr val="lt1">
-              <a:hueOff val="0"/>
-              <a:satOff val="0"/>
-              <a:lumOff val="0"/>
-              <a:alphaOff val="0"/>
-            </a:schemeClr>
-          </a:solidFill>
-          <a:prstDash val="solid"/>
-          <a:miter lim="800000"/>
-        </a:ln>
-        <a:effectLst/>
-      </dsp:spPr>
-      <dsp:style>
-        <a:lnRef idx="2">
-          <a:scrgbClr r="0" g="0" b="0"/>
-        </a:lnRef>
-        <a:fillRef idx="1">
-          <a:scrgbClr r="0" g="0" b="0"/>
-        </a:fillRef>
-        <a:effectRef idx="0">
-          <a:scrgbClr r="0" g="0" b="0"/>
-        </a:effectRef>
-        <a:fontRef idx="minor">
-          <a:schemeClr val="lt1"/>
-        </a:fontRef>
-      </dsp:style>
-      <dsp:txBody>
-        <a:bodyPr spcFirstLastPara="0" vert="horz" wrap="square" lIns="6350" tIns="6350" rIns="6350" bIns="6350" numCol="1" spcCol="1270" anchor="ctr" anchorCtr="0">
-          <a:noAutofit/>
-        </a:bodyPr>
-        <a:lstStyle/>
-        <a:p>
-          <a:pPr lvl="0" algn="ctr" defTabSz="444500">
-            <a:lnSpc>
-              <a:spcPct val="90000"/>
-            </a:lnSpc>
-            <a:spcBef>
-              <a:spcPct val="0"/>
-            </a:spcBef>
-            <a:spcAft>
-              <a:spcPct val="35000"/>
-            </a:spcAft>
-          </a:pPr>
-          <a:r>
-            <a:rPr lang="en-US" sz="1000" kern="1200" dirty="0" smtClean="0"/>
-            <a:t>Discuss/Create Ideas</a:t>
-          </a:r>
-          <a:endParaRPr lang="en-GB" sz="1000" kern="1200" dirty="0"/>
-        </a:p>
-      </dsp:txBody>
-      <dsp:txXfrm>
-        <a:off x="19907" y="1790461"/>
-        <a:ext cx="1209901" cy="586697"/>
-      </dsp:txXfrm>
-    </dsp:sp>
-    <dsp:sp modelId="{83866775-1D5B-4F51-9401-8EF0CCB88A32}">
-      <dsp:nvSpPr>
-        <dsp:cNvPr id="0" name=""/>
-        <dsp:cNvSpPr/>
-      </dsp:nvSpPr>
-      <dsp:spPr>
-        <a:xfrm>
-          <a:off x="1248062" y="2071417"/>
-          <a:ext cx="498563" cy="24785"/>
-        </a:xfrm>
-        <a:custGeom>
-          <a:avLst/>
-          <a:gdLst/>
-          <a:ahLst/>
-          <a:cxnLst/>
-          <a:rect l="0" t="0" r="0" b="0"/>
-          <a:pathLst>
-            <a:path>
-              <a:moveTo>
-                <a:pt x="0" y="12392"/>
-              </a:moveTo>
-              <a:lnTo>
-                <a:pt x="498563" y="12392"/>
-              </a:lnTo>
-            </a:path>
-          </a:pathLst>
-        </a:custGeom>
-        <a:noFill/>
-        <a:ln w="12700" cap="flat" cmpd="sng" algn="ctr">
-          <a:solidFill>
-            <a:schemeClr val="accent1">
-              <a:shade val="60000"/>
-              <a:hueOff val="0"/>
-              <a:satOff val="0"/>
-              <a:lumOff val="0"/>
-              <a:alphaOff val="0"/>
-            </a:schemeClr>
-          </a:solidFill>
-          <a:prstDash val="solid"/>
-          <a:miter lim="800000"/>
-        </a:ln>
-        <a:effectLst/>
-      </dsp:spPr>
-      <dsp:style>
-        <a:lnRef idx="2">
-          <a:scrgbClr r="0" g="0" b="0"/>
-        </a:lnRef>
-        <a:fillRef idx="0">
-          <a:scrgbClr r="0" g="0" b="0"/>
-        </a:fillRef>
-        <a:effectRef idx="0">
-          <a:scrgbClr r="0" g="0" b="0"/>
-        </a:effectRef>
-        <a:fontRef idx="minor"/>
-      </dsp:style>
-      <dsp:txBody>
-        <a:bodyPr spcFirstLastPara="0" vert="horz" wrap="square" lIns="12700" tIns="0" rIns="12700" bIns="0" numCol="1" spcCol="1270" anchor="ctr" anchorCtr="0">
-          <a:noAutofit/>
-        </a:bodyPr>
-        <a:lstStyle/>
-        <a:p>
-          <a:pPr lvl="0" algn="ctr" defTabSz="222250">
-            <a:lnSpc>
-              <a:spcPct val="90000"/>
-            </a:lnSpc>
-            <a:spcBef>
-              <a:spcPct val="0"/>
-            </a:spcBef>
-            <a:spcAft>
-              <a:spcPct val="35000"/>
-            </a:spcAft>
-          </a:pPr>
-          <a:endParaRPr lang="en-GB" sz="500" kern="1200"/>
-        </a:p>
-      </dsp:txBody>
-      <dsp:txXfrm>
-        <a:off x="1484879" y="2071346"/>
-        <a:ext cx="24928" cy="24928"/>
-      </dsp:txXfrm>
-    </dsp:sp>
-    <dsp:sp modelId="{6C45A68E-780E-4281-A513-226B04AF9F50}">
-      <dsp:nvSpPr>
-        <dsp:cNvPr id="0" name=""/>
-        <dsp:cNvSpPr/>
-      </dsp:nvSpPr>
-      <dsp:spPr>
-        <a:xfrm>
-          <a:off x="1746625" y="1772208"/>
-          <a:ext cx="1246407" cy="623203"/>
-        </a:xfrm>
-        <a:prstGeom prst="roundRect">
-          <a:avLst>
-            <a:gd name="adj" fmla="val 10000"/>
-          </a:avLst>
-        </a:prstGeom>
-        <a:solidFill>
-          <a:schemeClr val="accent1">
-            <a:hueOff val="0"/>
-            <a:satOff val="0"/>
-            <a:lumOff val="0"/>
-            <a:alphaOff val="0"/>
-          </a:schemeClr>
-        </a:solidFill>
-        <a:ln w="12700" cap="flat" cmpd="sng" algn="ctr">
-          <a:solidFill>
-            <a:schemeClr val="lt1">
-              <a:hueOff val="0"/>
-              <a:satOff val="0"/>
-              <a:lumOff val="0"/>
-              <a:alphaOff val="0"/>
-            </a:schemeClr>
-          </a:solidFill>
-          <a:prstDash val="solid"/>
-          <a:miter lim="800000"/>
-        </a:ln>
-        <a:effectLst/>
-      </dsp:spPr>
-      <dsp:style>
-        <a:lnRef idx="2">
-          <a:scrgbClr r="0" g="0" b="0"/>
-        </a:lnRef>
-        <a:fillRef idx="1">
-          <a:scrgbClr r="0" g="0" b="0"/>
-        </a:fillRef>
-        <a:effectRef idx="0">
-          <a:scrgbClr r="0" g="0" b="0"/>
-        </a:effectRef>
-        <a:fontRef idx="minor">
-          <a:schemeClr val="lt1"/>
-        </a:fontRef>
-      </dsp:style>
-      <dsp:txBody>
-        <a:bodyPr spcFirstLastPara="0" vert="horz" wrap="square" lIns="6350" tIns="6350" rIns="6350" bIns="6350" numCol="1" spcCol="1270" anchor="ctr" anchorCtr="0">
-          <a:noAutofit/>
-        </a:bodyPr>
-        <a:lstStyle/>
-        <a:p>
-          <a:pPr lvl="0" algn="ctr" defTabSz="444500">
-            <a:lnSpc>
-              <a:spcPct val="90000"/>
-            </a:lnSpc>
-            <a:spcBef>
-              <a:spcPct val="0"/>
-            </a:spcBef>
-            <a:spcAft>
-              <a:spcPct val="35000"/>
-            </a:spcAft>
-          </a:pPr>
-          <a:r>
-            <a:rPr lang="en-US" sz="1000" kern="1200" dirty="0" smtClean="0"/>
-            <a:t>Idea Playground</a:t>
-          </a:r>
-          <a:endParaRPr lang="en-GB" sz="1000" kern="1200" dirty="0"/>
-        </a:p>
-      </dsp:txBody>
-      <dsp:txXfrm>
-        <a:off x="1764878" y="1790461"/>
-        <a:ext cx="1209901" cy="586697"/>
-      </dsp:txXfrm>
-    </dsp:sp>
-    <dsp:sp modelId="{3D3BA283-AAC1-481E-90FB-1B418AAB1C6E}">
-      <dsp:nvSpPr>
-        <dsp:cNvPr id="0" name=""/>
-        <dsp:cNvSpPr/>
-      </dsp:nvSpPr>
-      <dsp:spPr>
-        <a:xfrm>
-          <a:off x="2993032" y="2071417"/>
-          <a:ext cx="498563" cy="24785"/>
-        </a:xfrm>
-        <a:custGeom>
-          <a:avLst/>
-          <a:gdLst/>
-          <a:ahLst/>
-          <a:cxnLst/>
-          <a:rect l="0" t="0" r="0" b="0"/>
-          <a:pathLst>
-            <a:path>
-              <a:moveTo>
-                <a:pt x="0" y="12392"/>
-              </a:moveTo>
-              <a:lnTo>
-                <a:pt x="498563" y="12392"/>
-              </a:lnTo>
-            </a:path>
-          </a:pathLst>
-        </a:custGeom>
-        <a:noFill/>
-        <a:ln w="12700" cap="flat" cmpd="sng" algn="ctr">
-          <a:solidFill>
-            <a:schemeClr val="accent1">
-              <a:shade val="80000"/>
-              <a:hueOff val="0"/>
-              <a:satOff val="0"/>
-              <a:lumOff val="0"/>
-              <a:alphaOff val="0"/>
-            </a:schemeClr>
-          </a:solidFill>
-          <a:prstDash val="solid"/>
-          <a:miter lim="800000"/>
-        </a:ln>
-        <a:effectLst/>
-      </dsp:spPr>
-      <dsp:style>
-        <a:lnRef idx="2">
-          <a:scrgbClr r="0" g="0" b="0"/>
-        </a:lnRef>
-        <a:fillRef idx="0">
-          <a:scrgbClr r="0" g="0" b="0"/>
-        </a:fillRef>
-        <a:effectRef idx="0">
-          <a:scrgbClr r="0" g="0" b="0"/>
-        </a:effectRef>
-        <a:fontRef idx="minor"/>
-      </dsp:style>
-      <dsp:txBody>
-        <a:bodyPr spcFirstLastPara="0" vert="horz" wrap="square" lIns="12700" tIns="0" rIns="12700" bIns="0" numCol="1" spcCol="1270" anchor="ctr" anchorCtr="0">
-          <a:noAutofit/>
-        </a:bodyPr>
-        <a:lstStyle/>
-        <a:p>
-          <a:pPr lvl="0" algn="ctr" defTabSz="222250">
-            <a:lnSpc>
-              <a:spcPct val="90000"/>
-            </a:lnSpc>
-            <a:spcBef>
-              <a:spcPct val="0"/>
-            </a:spcBef>
-            <a:spcAft>
-              <a:spcPct val="35000"/>
-            </a:spcAft>
-          </a:pPr>
-          <a:endParaRPr lang="en-GB" sz="500" kern="1200"/>
-        </a:p>
-      </dsp:txBody>
-      <dsp:txXfrm>
-        <a:off x="3229850" y="2071346"/>
-        <a:ext cx="24928" cy="24928"/>
-      </dsp:txXfrm>
-    </dsp:sp>
-    <dsp:sp modelId="{5BC2EF79-2EBA-4818-BA2E-055DCF0F7838}">
-      <dsp:nvSpPr>
-        <dsp:cNvPr id="0" name=""/>
-        <dsp:cNvSpPr/>
-      </dsp:nvSpPr>
-      <dsp:spPr>
-        <a:xfrm>
-          <a:off x="3491596" y="1772208"/>
-          <a:ext cx="1246407" cy="623203"/>
-        </a:xfrm>
-        <a:prstGeom prst="roundRect">
-          <a:avLst>
-            <a:gd name="adj" fmla="val 10000"/>
-          </a:avLst>
-        </a:prstGeom>
-        <a:solidFill>
-          <a:schemeClr val="accent1">
-            <a:hueOff val="0"/>
-            <a:satOff val="0"/>
-            <a:lumOff val="0"/>
-            <a:alphaOff val="0"/>
-          </a:schemeClr>
-        </a:solidFill>
-        <a:ln w="12700" cap="flat" cmpd="sng" algn="ctr">
-          <a:solidFill>
-            <a:schemeClr val="lt1">
-              <a:hueOff val="0"/>
-              <a:satOff val="0"/>
-              <a:lumOff val="0"/>
-              <a:alphaOff val="0"/>
-            </a:schemeClr>
-          </a:solidFill>
-          <a:prstDash val="solid"/>
-          <a:miter lim="800000"/>
-        </a:ln>
-        <a:effectLst/>
-      </dsp:spPr>
-      <dsp:style>
-        <a:lnRef idx="2">
-          <a:scrgbClr r="0" g="0" b="0"/>
-        </a:lnRef>
-        <a:fillRef idx="1">
-          <a:scrgbClr r="0" g="0" b="0"/>
-        </a:fillRef>
-        <a:effectRef idx="0">
-          <a:scrgbClr r="0" g="0" b="0"/>
-        </a:effectRef>
-        <a:fontRef idx="minor">
-          <a:schemeClr val="lt1"/>
-        </a:fontRef>
-      </dsp:style>
-      <dsp:txBody>
-        <a:bodyPr spcFirstLastPara="0" vert="horz" wrap="square" lIns="6350" tIns="6350" rIns="6350" bIns="6350" numCol="1" spcCol="1270" anchor="ctr" anchorCtr="0">
-          <a:noAutofit/>
-        </a:bodyPr>
-        <a:lstStyle/>
-        <a:p>
-          <a:pPr lvl="0" algn="ctr" defTabSz="444500">
-            <a:lnSpc>
-              <a:spcPct val="90000"/>
-            </a:lnSpc>
-            <a:spcBef>
-              <a:spcPct val="0"/>
-            </a:spcBef>
-            <a:spcAft>
-              <a:spcPct val="35000"/>
-            </a:spcAft>
-          </a:pPr>
-          <a:r>
-            <a:rPr lang="en-US" sz="1000" kern="1200" dirty="0" smtClean="0"/>
-            <a:t>Founders (alpha)</a:t>
-          </a:r>
-          <a:endParaRPr lang="en-GB" sz="1000" kern="1200" dirty="0"/>
-        </a:p>
-      </dsp:txBody>
-      <dsp:txXfrm>
-        <a:off x="3509849" y="1790461"/>
-        <a:ext cx="1209901" cy="586697"/>
-      </dsp:txXfrm>
-    </dsp:sp>
-    <dsp:sp modelId="{47A29E65-4240-4E11-B2B7-1851F734DA70}">
-      <dsp:nvSpPr>
-        <dsp:cNvPr id="0" name=""/>
-        <dsp:cNvSpPr/>
-      </dsp:nvSpPr>
-      <dsp:spPr>
-        <a:xfrm rot="18770822">
-          <a:off x="4620718" y="1802661"/>
-          <a:ext cx="733134" cy="24785"/>
-        </a:xfrm>
-        <a:custGeom>
-          <a:avLst/>
-          <a:gdLst/>
-          <a:ahLst/>
-          <a:cxnLst/>
-          <a:rect l="0" t="0" r="0" b="0"/>
-          <a:pathLst>
-            <a:path>
-              <a:moveTo>
-                <a:pt x="0" y="12392"/>
-              </a:moveTo>
-              <a:lnTo>
-                <a:pt x="733134" y="12392"/>
-              </a:lnTo>
-            </a:path>
-          </a:pathLst>
-        </a:custGeom>
-        <a:noFill/>
-        <a:ln w="12700" cap="flat" cmpd="sng" algn="ctr">
-          <a:solidFill>
-            <a:schemeClr val="accent1">
-              <a:shade val="80000"/>
-              <a:hueOff val="0"/>
-              <a:satOff val="0"/>
-              <a:lumOff val="0"/>
-              <a:alphaOff val="0"/>
-            </a:schemeClr>
-          </a:solidFill>
-          <a:prstDash val="solid"/>
-          <a:miter lim="800000"/>
-        </a:ln>
-        <a:effectLst/>
-      </dsp:spPr>
-      <dsp:style>
-        <a:lnRef idx="2">
-          <a:scrgbClr r="0" g="0" b="0"/>
-        </a:lnRef>
-        <a:fillRef idx="0">
-          <a:scrgbClr r="0" g="0" b="0"/>
-        </a:fillRef>
-        <a:effectRef idx="0">
-          <a:scrgbClr r="0" g="0" b="0"/>
-        </a:effectRef>
-        <a:fontRef idx="minor"/>
-      </dsp:style>
-      <dsp:txBody>
-        <a:bodyPr spcFirstLastPara="0" vert="horz" wrap="square" lIns="12700" tIns="0" rIns="12700" bIns="0" numCol="1" spcCol="1270" anchor="ctr" anchorCtr="0">
-          <a:noAutofit/>
-        </a:bodyPr>
-        <a:lstStyle/>
-        <a:p>
-          <a:pPr lvl="0" algn="ctr" defTabSz="222250">
-            <a:lnSpc>
-              <a:spcPct val="90000"/>
-            </a:lnSpc>
-            <a:spcBef>
-              <a:spcPct val="0"/>
-            </a:spcBef>
-            <a:spcAft>
-              <a:spcPct val="35000"/>
-            </a:spcAft>
-          </a:pPr>
-          <a:endParaRPr lang="en-GB" sz="500" kern="1200"/>
-        </a:p>
-      </dsp:txBody>
-      <dsp:txXfrm>
-        <a:off x="4968957" y="1796725"/>
-        <a:ext cx="36656" cy="36656"/>
-      </dsp:txXfrm>
-    </dsp:sp>
-    <dsp:sp modelId="{214D4C06-9246-49FD-B82F-2411377AF4AE}">
-      <dsp:nvSpPr>
-        <dsp:cNvPr id="0" name=""/>
-        <dsp:cNvSpPr/>
-      </dsp:nvSpPr>
-      <dsp:spPr>
-        <a:xfrm>
-          <a:off x="5236567" y="1234695"/>
-          <a:ext cx="1246407" cy="623203"/>
-        </a:xfrm>
-        <a:prstGeom prst="roundRect">
-          <a:avLst>
-            <a:gd name="adj" fmla="val 10000"/>
-          </a:avLst>
-        </a:prstGeom>
-        <a:solidFill>
-          <a:schemeClr val="accent1">
-            <a:hueOff val="0"/>
-            <a:satOff val="0"/>
-            <a:lumOff val="0"/>
-            <a:alphaOff val="0"/>
-          </a:schemeClr>
-        </a:solidFill>
-        <a:ln w="12700" cap="flat" cmpd="sng" algn="ctr">
-          <a:solidFill>
-            <a:schemeClr val="lt1">
-              <a:hueOff val="0"/>
-              <a:satOff val="0"/>
-              <a:lumOff val="0"/>
-              <a:alphaOff val="0"/>
-            </a:schemeClr>
-          </a:solidFill>
-          <a:prstDash val="solid"/>
-          <a:miter lim="800000"/>
-        </a:ln>
-        <a:effectLst/>
-      </dsp:spPr>
-      <dsp:style>
-        <a:lnRef idx="2">
-          <a:scrgbClr r="0" g="0" b="0"/>
-        </a:lnRef>
-        <a:fillRef idx="1">
-          <a:scrgbClr r="0" g="0" b="0"/>
-        </a:fillRef>
-        <a:effectRef idx="0">
-          <a:scrgbClr r="0" g="0" b="0"/>
-        </a:effectRef>
-        <a:fontRef idx="minor">
-          <a:schemeClr val="lt1"/>
-        </a:fontRef>
-      </dsp:style>
-      <dsp:txBody>
-        <a:bodyPr spcFirstLastPara="0" vert="horz" wrap="square" lIns="6350" tIns="6350" rIns="6350" bIns="6350" numCol="1" spcCol="1270" anchor="ctr" anchorCtr="0">
-          <a:noAutofit/>
-        </a:bodyPr>
-        <a:lstStyle/>
-        <a:p>
-          <a:pPr lvl="0" algn="ctr" defTabSz="444500">
-            <a:lnSpc>
-              <a:spcPct val="90000"/>
-            </a:lnSpc>
-            <a:spcBef>
-              <a:spcPct val="0"/>
-            </a:spcBef>
-            <a:spcAft>
-              <a:spcPct val="35000"/>
-            </a:spcAft>
-          </a:pPr>
-          <a:r>
-            <a:rPr lang="en-US" sz="1000" kern="1200" dirty="0" smtClean="0"/>
-            <a:t>if repetitive, change team (optional)</a:t>
-          </a:r>
-          <a:endParaRPr lang="en-GB" sz="1000" kern="1200" dirty="0"/>
-        </a:p>
-      </dsp:txBody>
-      <dsp:txXfrm>
-        <a:off x="5254820" y="1252948"/>
-        <a:ext cx="1209901" cy="586697"/>
-      </dsp:txXfrm>
-    </dsp:sp>
-    <dsp:sp modelId="{9B36C2B0-95D3-4EA5-8B02-6BBFE1C300BD}">
-      <dsp:nvSpPr>
-        <dsp:cNvPr id="0" name=""/>
-        <dsp:cNvSpPr/>
-      </dsp:nvSpPr>
-      <dsp:spPr>
-        <a:xfrm>
-          <a:off x="6482974" y="1533904"/>
-          <a:ext cx="498563" cy="24785"/>
-        </a:xfrm>
-        <a:custGeom>
-          <a:avLst/>
-          <a:gdLst/>
-          <a:ahLst/>
-          <a:cxnLst/>
-          <a:rect l="0" t="0" r="0" b="0"/>
-          <a:pathLst>
-            <a:path>
-              <a:moveTo>
-                <a:pt x="0" y="12392"/>
-              </a:moveTo>
-              <a:lnTo>
-                <a:pt x="498563" y="12392"/>
-              </a:lnTo>
-            </a:path>
-          </a:pathLst>
-        </a:custGeom>
-        <a:noFill/>
-        <a:ln w="12700" cap="flat" cmpd="sng" algn="ctr">
-          <a:solidFill>
-            <a:schemeClr val="accent1">
-              <a:shade val="80000"/>
-              <a:hueOff val="0"/>
-              <a:satOff val="0"/>
-              <a:lumOff val="0"/>
-              <a:alphaOff val="0"/>
-            </a:schemeClr>
-          </a:solidFill>
-          <a:prstDash val="solid"/>
-          <a:miter lim="800000"/>
-        </a:ln>
-        <a:effectLst/>
-      </dsp:spPr>
-      <dsp:style>
-        <a:lnRef idx="2">
-          <a:scrgbClr r="0" g="0" b="0"/>
-        </a:lnRef>
-        <a:fillRef idx="0">
-          <a:scrgbClr r="0" g="0" b="0"/>
-        </a:fillRef>
-        <a:effectRef idx="0">
-          <a:scrgbClr r="0" g="0" b="0"/>
-        </a:effectRef>
-        <a:fontRef idx="minor"/>
-      </dsp:style>
-      <dsp:txBody>
-        <a:bodyPr spcFirstLastPara="0" vert="horz" wrap="square" lIns="12700" tIns="0" rIns="12700" bIns="0" numCol="1" spcCol="1270" anchor="ctr" anchorCtr="0">
-          <a:noAutofit/>
-        </a:bodyPr>
-        <a:lstStyle/>
-        <a:p>
-          <a:pPr lvl="0" algn="ctr" defTabSz="222250">
-            <a:lnSpc>
-              <a:spcPct val="90000"/>
-            </a:lnSpc>
-            <a:spcBef>
-              <a:spcPct val="0"/>
-            </a:spcBef>
-            <a:spcAft>
-              <a:spcPct val="35000"/>
-            </a:spcAft>
-          </a:pPr>
-          <a:endParaRPr lang="en-GB" sz="500" kern="1200"/>
-        </a:p>
-      </dsp:txBody>
-      <dsp:txXfrm>
-        <a:off x="6719792" y="1533832"/>
-        <a:ext cx="24928" cy="24928"/>
-      </dsp:txXfrm>
-    </dsp:sp>
-    <dsp:sp modelId="{ED2EF8DF-BC9E-4109-B0A2-9A8ED946DA73}">
-      <dsp:nvSpPr>
-        <dsp:cNvPr id="0" name=""/>
-        <dsp:cNvSpPr/>
-      </dsp:nvSpPr>
-      <dsp:spPr>
-        <a:xfrm>
-          <a:off x="6981537" y="1234695"/>
-          <a:ext cx="1246407" cy="623203"/>
-        </a:xfrm>
-        <a:prstGeom prst="roundRect">
-          <a:avLst>
-            <a:gd name="adj" fmla="val 10000"/>
-          </a:avLst>
-        </a:prstGeom>
-        <a:solidFill>
-          <a:schemeClr val="accent1">
-            <a:hueOff val="0"/>
-            <a:satOff val="0"/>
-            <a:lumOff val="0"/>
-            <a:alphaOff val="0"/>
-          </a:schemeClr>
-        </a:solidFill>
-        <a:ln w="12700" cap="flat" cmpd="sng" algn="ctr">
-          <a:solidFill>
-            <a:schemeClr val="lt1">
-              <a:hueOff val="0"/>
-              <a:satOff val="0"/>
-              <a:lumOff val="0"/>
-              <a:alphaOff val="0"/>
-            </a:schemeClr>
-          </a:solidFill>
-          <a:prstDash val="solid"/>
-          <a:miter lim="800000"/>
-        </a:ln>
-        <a:effectLst/>
-      </dsp:spPr>
-      <dsp:style>
-        <a:lnRef idx="2">
-          <a:scrgbClr r="0" g="0" b="0"/>
-        </a:lnRef>
-        <a:fillRef idx="1">
-          <a:scrgbClr r="0" g="0" b="0"/>
-        </a:fillRef>
-        <a:effectRef idx="0">
-          <a:scrgbClr r="0" g="0" b="0"/>
-        </a:effectRef>
-        <a:fontRef idx="minor">
-          <a:schemeClr val="lt1"/>
-        </a:fontRef>
-      </dsp:style>
-      <dsp:txBody>
-        <a:bodyPr spcFirstLastPara="0" vert="horz" wrap="square" lIns="6350" tIns="6350" rIns="6350" bIns="6350" numCol="1" spcCol="1270" anchor="ctr" anchorCtr="0">
-          <a:noAutofit/>
-        </a:bodyPr>
-        <a:lstStyle/>
-        <a:p>
-          <a:pPr lvl="0" algn="ctr" defTabSz="444500">
-            <a:lnSpc>
-              <a:spcPct val="90000"/>
-            </a:lnSpc>
-            <a:spcBef>
-              <a:spcPct val="0"/>
-            </a:spcBef>
-            <a:spcAft>
-              <a:spcPct val="35000"/>
-            </a:spcAft>
-          </a:pPr>
-          <a:r>
-            <a:rPr lang="en-US" sz="1000" kern="1200" dirty="0" smtClean="0"/>
-            <a:t>Continue work, beta state</a:t>
-          </a:r>
-          <a:endParaRPr lang="en-GB" sz="1000" kern="1200" dirty="0"/>
-        </a:p>
-      </dsp:txBody>
-      <dsp:txXfrm>
-        <a:off x="6999790" y="1252948"/>
-        <a:ext cx="1209901" cy="586697"/>
-      </dsp:txXfrm>
-    </dsp:sp>
-    <dsp:sp modelId="{8C7D9B4B-AD28-47A5-B7D5-C4B3BA223953}">
-      <dsp:nvSpPr>
-        <dsp:cNvPr id="0" name=""/>
-        <dsp:cNvSpPr/>
-      </dsp:nvSpPr>
-      <dsp:spPr>
-        <a:xfrm rot="2829178">
-          <a:off x="4620718" y="2340174"/>
-          <a:ext cx="733134" cy="24785"/>
-        </a:xfrm>
-        <a:custGeom>
-          <a:avLst/>
-          <a:gdLst/>
-          <a:ahLst/>
-          <a:cxnLst/>
-          <a:rect l="0" t="0" r="0" b="0"/>
-          <a:pathLst>
-            <a:path>
-              <a:moveTo>
-                <a:pt x="0" y="12392"/>
-              </a:moveTo>
-              <a:lnTo>
-                <a:pt x="733134" y="12392"/>
-              </a:lnTo>
-            </a:path>
-          </a:pathLst>
-        </a:custGeom>
-        <a:noFill/>
-        <a:ln w="12700" cap="flat" cmpd="sng" algn="ctr">
-          <a:solidFill>
-            <a:schemeClr val="accent1">
-              <a:shade val="80000"/>
-              <a:hueOff val="0"/>
-              <a:satOff val="0"/>
-              <a:lumOff val="0"/>
-              <a:alphaOff val="0"/>
-            </a:schemeClr>
-          </a:solidFill>
-          <a:prstDash val="solid"/>
-          <a:miter lim="800000"/>
-        </a:ln>
-        <a:effectLst/>
-      </dsp:spPr>
-      <dsp:style>
-        <a:lnRef idx="2">
-          <a:scrgbClr r="0" g="0" b="0"/>
-        </a:lnRef>
-        <a:fillRef idx="0">
-          <a:scrgbClr r="0" g="0" b="0"/>
-        </a:fillRef>
-        <a:effectRef idx="0">
-          <a:scrgbClr r="0" g="0" b="0"/>
-        </a:effectRef>
-        <a:fontRef idx="minor"/>
-      </dsp:style>
-      <dsp:txBody>
-        <a:bodyPr spcFirstLastPara="0" vert="horz" wrap="square" lIns="12700" tIns="0" rIns="12700" bIns="0" numCol="1" spcCol="1270" anchor="ctr" anchorCtr="0">
-          <a:noAutofit/>
-        </a:bodyPr>
-        <a:lstStyle/>
-        <a:p>
-          <a:pPr lvl="0" algn="ctr" defTabSz="222250">
-            <a:lnSpc>
-              <a:spcPct val="90000"/>
-            </a:lnSpc>
-            <a:spcBef>
-              <a:spcPct val="0"/>
-            </a:spcBef>
-            <a:spcAft>
-              <a:spcPct val="35000"/>
-            </a:spcAft>
-          </a:pPr>
-          <a:endParaRPr lang="en-GB" sz="500" kern="1200"/>
-        </a:p>
-      </dsp:txBody>
-      <dsp:txXfrm>
-        <a:off x="4968957" y="2334238"/>
-        <a:ext cx="36656" cy="36656"/>
-      </dsp:txXfrm>
-    </dsp:sp>
-    <dsp:sp modelId="{2B68A0A6-6657-4314-BA8A-155F2B6D980F}">
-      <dsp:nvSpPr>
-        <dsp:cNvPr id="0" name=""/>
-        <dsp:cNvSpPr/>
-      </dsp:nvSpPr>
-      <dsp:spPr>
-        <a:xfrm>
-          <a:off x="5236567" y="2309721"/>
-          <a:ext cx="1246407" cy="623203"/>
-        </a:xfrm>
-        <a:prstGeom prst="roundRect">
-          <a:avLst>
-            <a:gd name="adj" fmla="val 10000"/>
-          </a:avLst>
-        </a:prstGeom>
-        <a:solidFill>
-          <a:schemeClr val="accent1">
-            <a:hueOff val="0"/>
-            <a:satOff val="0"/>
-            <a:lumOff val="0"/>
-            <a:alphaOff val="0"/>
-          </a:schemeClr>
-        </a:solidFill>
-        <a:ln w="12700" cap="flat" cmpd="sng" algn="ctr">
-          <a:solidFill>
-            <a:schemeClr val="lt1">
-              <a:hueOff val="0"/>
-              <a:satOff val="0"/>
-              <a:lumOff val="0"/>
-              <a:alphaOff val="0"/>
-            </a:schemeClr>
-          </a:solidFill>
-          <a:prstDash val="solid"/>
-          <a:miter lim="800000"/>
-        </a:ln>
-        <a:effectLst/>
-      </dsp:spPr>
-      <dsp:style>
-        <a:lnRef idx="2">
-          <a:scrgbClr r="0" g="0" b="0"/>
-        </a:lnRef>
-        <a:fillRef idx="1">
-          <a:scrgbClr r="0" g="0" b="0"/>
-        </a:fillRef>
-        <a:effectRef idx="0">
-          <a:scrgbClr r="0" g="0" b="0"/>
-        </a:effectRef>
-        <a:fontRef idx="minor">
-          <a:schemeClr val="lt1"/>
-        </a:fontRef>
-      </dsp:style>
-      <dsp:txBody>
-        <a:bodyPr spcFirstLastPara="0" vert="horz" wrap="square" lIns="6350" tIns="6350" rIns="6350" bIns="6350" numCol="1" spcCol="1270" anchor="ctr" anchorCtr="0">
-          <a:noAutofit/>
-        </a:bodyPr>
-        <a:lstStyle/>
-        <a:p>
-          <a:pPr lvl="0" algn="ctr" defTabSz="444500">
-            <a:lnSpc>
-              <a:spcPct val="90000"/>
-            </a:lnSpc>
-            <a:spcBef>
-              <a:spcPct val="0"/>
-            </a:spcBef>
-            <a:spcAft>
-              <a:spcPct val="35000"/>
-            </a:spcAft>
-          </a:pPr>
-          <a:r>
-            <a:rPr lang="en-US" sz="1000" kern="1200" dirty="0" smtClean="0"/>
-            <a:t>if not repetitive</a:t>
-          </a:r>
-          <a:endParaRPr lang="en-GB" sz="1000" kern="1200" dirty="0"/>
-        </a:p>
-      </dsp:txBody>
-      <dsp:txXfrm>
-        <a:off x="5254820" y="2327974"/>
-        <a:ext cx="1209901" cy="586697"/>
-      </dsp:txXfrm>
-    </dsp:sp>
-    <dsp:sp modelId="{E8265A4D-14A2-41C4-AD2F-F82AE4E66BCD}">
-      <dsp:nvSpPr>
-        <dsp:cNvPr id="0" name=""/>
-        <dsp:cNvSpPr/>
-      </dsp:nvSpPr>
-      <dsp:spPr>
-        <a:xfrm rot="19457599">
-          <a:off x="6425265" y="2429760"/>
-          <a:ext cx="613982" cy="24785"/>
-        </a:xfrm>
-        <a:custGeom>
-          <a:avLst/>
-          <a:gdLst/>
-          <a:ahLst/>
-          <a:cxnLst/>
-          <a:rect l="0" t="0" r="0" b="0"/>
-          <a:pathLst>
-            <a:path>
-              <a:moveTo>
-                <a:pt x="0" y="12392"/>
-              </a:moveTo>
-              <a:lnTo>
-                <a:pt x="613982" y="12392"/>
-              </a:lnTo>
-            </a:path>
-          </a:pathLst>
-        </a:custGeom>
-        <a:noFill/>
-        <a:ln w="12700" cap="flat" cmpd="sng" algn="ctr">
-          <a:solidFill>
-            <a:schemeClr val="accent1">
-              <a:shade val="80000"/>
-              <a:hueOff val="0"/>
-              <a:satOff val="0"/>
-              <a:lumOff val="0"/>
-              <a:alphaOff val="0"/>
-            </a:schemeClr>
-          </a:solidFill>
-          <a:prstDash val="solid"/>
-          <a:miter lim="800000"/>
-        </a:ln>
-        <a:effectLst/>
-      </dsp:spPr>
-      <dsp:style>
-        <a:lnRef idx="2">
-          <a:scrgbClr r="0" g="0" b="0"/>
-        </a:lnRef>
-        <a:fillRef idx="0">
-          <a:scrgbClr r="0" g="0" b="0"/>
-        </a:fillRef>
-        <a:effectRef idx="0">
-          <a:scrgbClr r="0" g="0" b="0"/>
-        </a:effectRef>
-        <a:fontRef idx="minor"/>
-      </dsp:style>
-      <dsp:txBody>
-        <a:bodyPr spcFirstLastPara="0" vert="horz" wrap="square" lIns="12700" tIns="0" rIns="12700" bIns="0" numCol="1" spcCol="1270" anchor="ctr" anchorCtr="0">
-          <a:noAutofit/>
-        </a:bodyPr>
-        <a:lstStyle/>
-        <a:p>
-          <a:pPr lvl="0" algn="ctr" defTabSz="222250">
-            <a:lnSpc>
-              <a:spcPct val="90000"/>
-            </a:lnSpc>
-            <a:spcBef>
-              <a:spcPct val="0"/>
-            </a:spcBef>
-            <a:spcAft>
-              <a:spcPct val="35000"/>
-            </a:spcAft>
-          </a:pPr>
-          <a:endParaRPr lang="en-GB" sz="500" kern="1200"/>
-        </a:p>
-      </dsp:txBody>
-      <dsp:txXfrm>
-        <a:off x="6716906" y="2426803"/>
-        <a:ext cx="30699" cy="30699"/>
-      </dsp:txXfrm>
-    </dsp:sp>
-    <dsp:sp modelId="{6A81EAF1-5E31-4021-84F1-BFD626074E40}">
-      <dsp:nvSpPr>
-        <dsp:cNvPr id="0" name=""/>
-        <dsp:cNvSpPr/>
-      </dsp:nvSpPr>
-      <dsp:spPr>
-        <a:xfrm>
-          <a:off x="6981537" y="1951379"/>
-          <a:ext cx="1246407" cy="623203"/>
-        </a:xfrm>
-        <a:prstGeom prst="roundRect">
-          <a:avLst>
-            <a:gd name="adj" fmla="val 10000"/>
-          </a:avLst>
-        </a:prstGeom>
-        <a:solidFill>
-          <a:schemeClr val="accent1">
-            <a:hueOff val="0"/>
-            <a:satOff val="0"/>
-            <a:lumOff val="0"/>
-            <a:alphaOff val="0"/>
-          </a:schemeClr>
-        </a:solidFill>
-        <a:ln w="12700" cap="flat" cmpd="sng" algn="ctr">
-          <a:solidFill>
-            <a:schemeClr val="lt1">
-              <a:hueOff val="0"/>
-              <a:satOff val="0"/>
-              <a:lumOff val="0"/>
-              <a:alphaOff val="0"/>
-            </a:schemeClr>
-          </a:solidFill>
-          <a:prstDash val="solid"/>
-          <a:miter lim="800000"/>
-        </a:ln>
-        <a:effectLst/>
-      </dsp:spPr>
-      <dsp:style>
-        <a:lnRef idx="2">
-          <a:scrgbClr r="0" g="0" b="0"/>
-        </a:lnRef>
-        <a:fillRef idx="1">
-          <a:scrgbClr r="0" g="0" b="0"/>
-        </a:fillRef>
-        <a:effectRef idx="0">
-          <a:scrgbClr r="0" g="0" b="0"/>
-        </a:effectRef>
-        <a:fontRef idx="minor">
-          <a:schemeClr val="lt1"/>
-        </a:fontRef>
-      </dsp:style>
-      <dsp:txBody>
-        <a:bodyPr spcFirstLastPara="0" vert="horz" wrap="square" lIns="6350" tIns="6350" rIns="6350" bIns="6350" numCol="1" spcCol="1270" anchor="ctr" anchorCtr="0">
-          <a:noAutofit/>
-        </a:bodyPr>
-        <a:lstStyle/>
-        <a:p>
-          <a:pPr lvl="0" algn="ctr" defTabSz="444500">
-            <a:lnSpc>
-              <a:spcPct val="90000"/>
-            </a:lnSpc>
-            <a:spcBef>
-              <a:spcPct val="0"/>
-            </a:spcBef>
-            <a:spcAft>
-              <a:spcPct val="35000"/>
-            </a:spcAft>
-          </a:pPr>
-          <a:r>
-            <a:rPr lang="en-US" sz="1000" kern="1200" dirty="0" smtClean="0"/>
-            <a:t>if complete | Hall of Fame!</a:t>
-          </a:r>
-          <a:endParaRPr lang="en-GB" sz="1000" kern="1200" dirty="0"/>
-        </a:p>
-      </dsp:txBody>
-      <dsp:txXfrm>
-        <a:off x="6999790" y="1969632"/>
-        <a:ext cx="1209901" cy="586697"/>
-      </dsp:txXfrm>
-    </dsp:sp>
-    <dsp:sp modelId="{66624516-2FB2-4F8D-A87A-F4860C708AE5}">
-      <dsp:nvSpPr>
-        <dsp:cNvPr id="0" name=""/>
-        <dsp:cNvSpPr/>
-      </dsp:nvSpPr>
-      <dsp:spPr>
-        <a:xfrm rot="2142401">
-          <a:off x="6425265" y="2788102"/>
-          <a:ext cx="613982" cy="24785"/>
-        </a:xfrm>
-        <a:custGeom>
-          <a:avLst/>
-          <a:gdLst/>
-          <a:ahLst/>
-          <a:cxnLst/>
-          <a:rect l="0" t="0" r="0" b="0"/>
-          <a:pathLst>
-            <a:path>
-              <a:moveTo>
-                <a:pt x="0" y="12392"/>
-              </a:moveTo>
-              <a:lnTo>
-                <a:pt x="613982" y="12392"/>
-              </a:lnTo>
-            </a:path>
-          </a:pathLst>
-        </a:custGeom>
-        <a:noFill/>
-        <a:ln w="12700" cap="flat" cmpd="sng" algn="ctr">
-          <a:solidFill>
-            <a:schemeClr val="accent1">
-              <a:shade val="80000"/>
-              <a:hueOff val="0"/>
-              <a:satOff val="0"/>
-              <a:lumOff val="0"/>
-              <a:alphaOff val="0"/>
-            </a:schemeClr>
-          </a:solidFill>
-          <a:prstDash val="solid"/>
-          <a:miter lim="800000"/>
-        </a:ln>
-        <a:effectLst/>
-      </dsp:spPr>
-      <dsp:style>
-        <a:lnRef idx="2">
-          <a:scrgbClr r="0" g="0" b="0"/>
-        </a:lnRef>
-        <a:fillRef idx="0">
-          <a:scrgbClr r="0" g="0" b="0"/>
-        </a:fillRef>
-        <a:effectRef idx="0">
-          <a:scrgbClr r="0" g="0" b="0"/>
-        </a:effectRef>
-        <a:fontRef idx="minor"/>
-      </dsp:style>
-      <dsp:txBody>
-        <a:bodyPr spcFirstLastPara="0" vert="horz" wrap="square" lIns="12700" tIns="0" rIns="12700" bIns="0" numCol="1" spcCol="1270" anchor="ctr" anchorCtr="0">
-          <a:noAutofit/>
-        </a:bodyPr>
-        <a:lstStyle/>
-        <a:p>
-          <a:pPr lvl="0" algn="ctr" defTabSz="222250">
-            <a:lnSpc>
-              <a:spcPct val="90000"/>
-            </a:lnSpc>
-            <a:spcBef>
-              <a:spcPct val="0"/>
-            </a:spcBef>
-            <a:spcAft>
-              <a:spcPct val="35000"/>
-            </a:spcAft>
-          </a:pPr>
-          <a:endParaRPr lang="en-GB" sz="500" kern="1200"/>
-        </a:p>
-      </dsp:txBody>
-      <dsp:txXfrm>
-        <a:off x="6716906" y="2785145"/>
-        <a:ext cx="30699" cy="30699"/>
-      </dsp:txXfrm>
-    </dsp:sp>
-    <dsp:sp modelId="{093629A4-7C69-4A3E-B9A6-E216E5E62A9F}">
-      <dsp:nvSpPr>
-        <dsp:cNvPr id="0" name=""/>
-        <dsp:cNvSpPr/>
-      </dsp:nvSpPr>
-      <dsp:spPr>
-        <a:xfrm>
-          <a:off x="6981537" y="2668064"/>
-          <a:ext cx="1246407" cy="623203"/>
-        </a:xfrm>
-        <a:prstGeom prst="roundRect">
-          <a:avLst>
-            <a:gd name="adj" fmla="val 10000"/>
-          </a:avLst>
-        </a:prstGeom>
-        <a:solidFill>
-          <a:schemeClr val="accent1">
-            <a:hueOff val="0"/>
-            <a:satOff val="0"/>
-            <a:lumOff val="0"/>
-            <a:alphaOff val="0"/>
-          </a:schemeClr>
-        </a:solidFill>
-        <a:ln w="12700" cap="flat" cmpd="sng" algn="ctr">
-          <a:solidFill>
-            <a:schemeClr val="lt1">
-              <a:hueOff val="0"/>
-              <a:satOff val="0"/>
-              <a:lumOff val="0"/>
-              <a:alphaOff val="0"/>
-            </a:schemeClr>
-          </a:solidFill>
-          <a:prstDash val="solid"/>
-          <a:miter lim="800000"/>
-        </a:ln>
-        <a:effectLst/>
-      </dsp:spPr>
-      <dsp:style>
-        <a:lnRef idx="2">
-          <a:scrgbClr r="0" g="0" b="0"/>
-        </a:lnRef>
-        <a:fillRef idx="1">
-          <a:scrgbClr r="0" g="0" b="0"/>
-        </a:fillRef>
-        <a:effectRef idx="0">
-          <a:scrgbClr r="0" g="0" b="0"/>
-        </a:effectRef>
-        <a:fontRef idx="minor">
-          <a:schemeClr val="lt1"/>
-        </a:fontRef>
-      </dsp:style>
-      <dsp:txBody>
-        <a:bodyPr spcFirstLastPara="0" vert="horz" wrap="square" lIns="6350" tIns="6350" rIns="6350" bIns="6350" numCol="1" spcCol="1270" anchor="ctr" anchorCtr="0">
-          <a:noAutofit/>
-        </a:bodyPr>
-        <a:lstStyle/>
-        <a:p>
-          <a:pPr lvl="0" algn="ctr" defTabSz="444500">
-            <a:lnSpc>
-              <a:spcPct val="90000"/>
-            </a:lnSpc>
-            <a:spcBef>
-              <a:spcPct val="0"/>
-            </a:spcBef>
-            <a:spcAft>
-              <a:spcPct val="35000"/>
-            </a:spcAft>
-          </a:pPr>
-          <a:r>
-            <a:rPr lang="en-US" sz="1000" kern="1200" dirty="0" smtClean="0"/>
-            <a:t>still work left to be done, then state beta</a:t>
-          </a:r>
-          <a:br>
-            <a:rPr lang="en-US" sz="1000" kern="1200" dirty="0" smtClean="0"/>
-          </a:br>
-          <a:endParaRPr lang="en-GB" sz="1000" kern="1200" dirty="0"/>
-        </a:p>
-      </dsp:txBody>
-      <dsp:txXfrm>
-        <a:off x="6999790" y="2686317"/>
-        <a:ext cx="1209901" cy="586697"/>
-      </dsp:txXfrm>
-    </dsp:sp>
   </dsp:spTree>
 </dsp:drawing>
 </file>
@@ -4625,7 +3422,7 @@
           <a:p>
             <a:fld id="{A8224893-DBDA-4BFA-9CE1-4BFE7CD0F8CF}" type="datetime1">
               <a:rPr lang="en-US" smtClean="0"/>
-              <a:t>1/15/2013</a:t>
+              <a:t>3/20/2013</a:t>
             </a:fld>
             <a:endParaRPr lang="en-US"/>
           </a:p>
@@ -4805,7 +3602,7 @@
           <a:p>
             <a:fld id="{5F4E5243-F52A-4D37-9694-EB26C6C31910}" type="datetime1">
               <a:rPr lang="en-US" smtClean="0"/>
-              <a:t>1/15/2013</a:t>
+              <a:t>3/20/2013</a:t>
             </a:fld>
             <a:endParaRPr lang="en-US"/>
           </a:p>
@@ -4995,7 +3792,7 @@
           <a:p>
             <a:fld id="{3A77B6E1-634A-48DC-9E8B-D894023267EF}" type="datetime1">
               <a:rPr lang="en-US" smtClean="0"/>
-              <a:t>1/15/2013</a:t>
+              <a:t>3/20/2013</a:t>
             </a:fld>
             <a:endParaRPr lang="en-US"/>
           </a:p>
@@ -5208,7 +4005,7 @@
           <a:p>
             <a:fld id="{A8224893-DBDA-4BFA-9CE1-4BFE7CD0F8CF}" type="datetime1">
               <a:rPr lang="en-US" smtClean="0"/>
-              <a:t>1/15/2013</a:t>
+              <a:t>3/20/2013</a:t>
             </a:fld>
             <a:endParaRPr lang="en-US"/>
           </a:p>
@@ -5388,7 +4185,7 @@
           <a:p>
             <a:fld id="{7B2D3E9E-A95C-48F2-B4BF-A71542E0BE9A}" type="datetime1">
               <a:rPr lang="en-US" smtClean="0"/>
-              <a:t>1/15/2013</a:t>
+              <a:t>3/20/2013</a:t>
             </a:fld>
             <a:endParaRPr lang="en-US"/>
           </a:p>
@@ -5649,7 +4446,7 @@
           <a:p>
             <a:fld id="{A50F84E2-2D7A-43CF-AC90-352A289A783A}" type="datetime1">
               <a:rPr lang="en-US" smtClean="0"/>
-              <a:t>1/15/2013</a:t>
+              <a:t>3/20/2013</a:t>
             </a:fld>
             <a:endParaRPr lang="en-US"/>
           </a:p>
@@ -5891,7 +4688,7 @@
           <a:p>
             <a:fld id="{F12952B5-7A2F-4CC8-B7CE-9234E21C2837}" type="datetime1">
               <a:rPr lang="en-US" smtClean="0"/>
-              <a:t>1/15/2013</a:t>
+              <a:t>3/20/2013</a:t>
             </a:fld>
             <a:endParaRPr lang="en-US"/>
           </a:p>
@@ -6248,7 +5045,7 @@
           <a:p>
             <a:fld id="{CE1DA07A-9201-4B4B-BAF2-015AFA30F520}" type="datetime1">
               <a:rPr lang="en-US" smtClean="0"/>
-              <a:t>1/15/2013</a:t>
+              <a:t>3/20/2013</a:t>
             </a:fld>
             <a:endParaRPr lang="en-US"/>
           </a:p>
@@ -6376,7 +5173,7 @@
           <a:p>
             <a:fld id="{73D7E00A-486F-4252-8B1D-E32645521F49}" type="datetime1">
               <a:rPr lang="en-US" smtClean="0"/>
-              <a:t>1/15/2013</a:t>
+              <a:t>3/20/2013</a:t>
             </a:fld>
             <a:endParaRPr lang="en-US"/>
           </a:p>
@@ -6504,7 +5301,7 @@
           <a:p>
             <a:fld id="{8DDF5F92-E675-4B36-9A60-69A962A68675}" type="datetime1">
               <a:rPr lang="en-US" smtClean="0"/>
-              <a:t>1/15/2013</a:t>
+              <a:t>3/20/2013</a:t>
             </a:fld>
             <a:endParaRPr lang="en-US"/>
           </a:p>
@@ -6798,7 +5595,7 @@
           <a:p>
             <a:fld id="{AF6E2C9B-5FA2-460D-9BE7-B0812FC2A6FF}" type="datetime1">
               <a:rPr lang="en-US" smtClean="0"/>
-              <a:t>1/15/2013</a:t>
+              <a:t>3/20/2013</a:t>
             </a:fld>
             <a:endParaRPr lang="en-US"/>
           </a:p>
@@ -6978,7 +5775,7 @@
           <a:p>
             <a:fld id="{7B2D3E9E-A95C-48F2-B4BF-A71542E0BE9A}" type="datetime1">
               <a:rPr lang="en-US" smtClean="0"/>
-              <a:t>1/15/2013</a:t>
+              <a:t>3/20/2013</a:t>
             </a:fld>
             <a:endParaRPr lang="en-US"/>
           </a:p>
@@ -7252,7 +6049,7 @@
           <a:p>
             <a:fld id="{1D374940-A916-4C8B-9648-02A2D3898F9E}" type="datetime1">
               <a:rPr lang="en-US" smtClean="0"/>
-              <a:t>1/15/2013</a:t>
+              <a:t>3/20/2013</a:t>
             </a:fld>
             <a:endParaRPr lang="en-US"/>
           </a:p>
@@ -7432,7 +6229,7 @@
           <a:p>
             <a:fld id="{5F4E5243-F52A-4D37-9694-EB26C6C31910}" type="datetime1">
               <a:rPr lang="en-US" smtClean="0"/>
-              <a:t>1/15/2013</a:t>
+              <a:t>3/20/2013</a:t>
             </a:fld>
             <a:endParaRPr lang="en-US"/>
           </a:p>
@@ -7622,7 +6419,7 @@
           <a:p>
             <a:fld id="{3A77B6E1-634A-48DC-9E8B-D894023267EF}" type="datetime1">
               <a:rPr lang="en-US" smtClean="0"/>
-              <a:t>1/15/2013</a:t>
+              <a:t>3/20/2013</a:t>
             </a:fld>
             <a:endParaRPr lang="en-US"/>
           </a:p>
@@ -7824,7 +6621,7 @@
           <a:p>
             <a:fld id="{A50F84E2-2D7A-43CF-AC90-352A289A783A}" type="datetime1">
               <a:rPr lang="en-US" smtClean="0"/>
-              <a:t>1/15/2013</a:t>
+              <a:t>3/20/2013</a:t>
             </a:fld>
             <a:endParaRPr lang="en-US"/>
           </a:p>
@@ -8122,7 +6919,7 @@
           <a:p>
             <a:fld id="{F12952B5-7A2F-4CC8-B7CE-9234E21C2837}" type="datetime1">
               <a:rPr lang="en-US" smtClean="0"/>
-              <a:t>1/15/2013</a:t>
+              <a:t>3/20/2013</a:t>
             </a:fld>
             <a:endParaRPr lang="en-US"/>
           </a:p>
@@ -8555,7 +7352,7 @@
           <a:p>
             <a:fld id="{CE1DA07A-9201-4B4B-BAF2-015AFA30F520}" type="datetime1">
               <a:rPr lang="en-US" smtClean="0"/>
-              <a:t>1/15/2013</a:t>
+              <a:t>3/20/2013</a:t>
             </a:fld>
             <a:endParaRPr lang="en-US"/>
           </a:p>
@@ -8683,7 +7480,7 @@
           <a:p>
             <a:fld id="{73D7E00A-486F-4252-8B1D-E32645521F49}" type="datetime1">
               <a:rPr lang="en-US" smtClean="0"/>
-              <a:t>1/15/2013</a:t>
+              <a:t>3/20/2013</a:t>
             </a:fld>
             <a:endParaRPr lang="en-US"/>
           </a:p>
@@ -8788,7 +7585,7 @@
           <a:p>
             <a:fld id="{8DDF5F92-E675-4B36-9A60-69A962A68675}" type="datetime1">
               <a:rPr lang="en-US" smtClean="0"/>
-              <a:t>1/15/2013</a:t>
+              <a:t>3/20/2013</a:t>
             </a:fld>
             <a:endParaRPr lang="en-US"/>
           </a:p>
@@ -9075,7 +7872,7 @@
           <a:p>
             <a:fld id="{AF6E2C9B-5FA2-460D-9BE7-B0812FC2A6FF}" type="datetime1">
               <a:rPr lang="en-US" smtClean="0"/>
-              <a:t>1/15/2013</a:t>
+              <a:t>3/20/2013</a:t>
             </a:fld>
             <a:endParaRPr lang="en-US"/>
           </a:p>
@@ -9338,7 +8135,7 @@
           <a:p>
             <a:fld id="{1D374940-A916-4C8B-9648-02A2D3898F9E}" type="datetime1">
               <a:rPr lang="en-US" smtClean="0"/>
-              <a:t>1/15/2013</a:t>
+              <a:t>3/20/2013</a:t>
             </a:fld>
             <a:endParaRPr lang="en-US"/>
           </a:p>
@@ -9561,7 +8358,7 @@
           <a:p>
             <a:fld id="{5586B75A-687E-405C-8A0B-8D00578BA2C3}" type="datetime1">
               <a:rPr lang="en-US" smtClean="0"/>
-              <a:t>1/15/2013</a:t>
+              <a:t>3/20/2013</a:t>
             </a:fld>
             <a:endParaRPr lang="en-US"/>
           </a:p>
@@ -10110,7 +8907,7 @@
           <a:p>
             <a:fld id="{5586B75A-687E-405C-8A0B-8D00578BA2C3}" type="datetime1">
               <a:rPr lang="en-US" smtClean="0"/>
-              <a:t>1/15/2013</a:t>
+              <a:t>3/20/2013</a:t>
             </a:fld>
             <a:endParaRPr lang="en-US"/>
           </a:p>
@@ -10996,7 +9793,7 @@
           <a:p>
             <a:fld id="{B11D738E-8962-435F-8C43-147B8DD7E819}" type="datetime1">
               <a:rPr lang="en-US" smtClean="0"/>
-              <a:t>1/15/2013</a:t>
+              <a:t>3/20/2013</a:t>
             </a:fld>
             <a:endParaRPr lang="en-US"/>
           </a:p>
@@ -11345,12 +10142,8 @@
               <a:t>Viewer discretion is </a:t>
             </a:r>
             <a:r>
-              <a:rPr lang="en-US" dirty="0" err="1" smtClean="0"/>
-              <a:t>adviced</a:t>
-            </a:r>
-            <a:r>
               <a:rPr lang="en-US" dirty="0" smtClean="0"/>
-              <a:t>.</a:t>
+              <a:t>advised.</a:t>
             </a:r>
             <a:endParaRPr lang="en-GB" dirty="0"/>
           </a:p>
@@ -11600,15 +10393,7 @@
             <a:pPr lvl="1"/>
             <a:r>
               <a:rPr lang="en-US" dirty="0" smtClean="0"/>
-              <a:t>Opportunity Cell Meet (near </a:t>
-            </a:r>
-            <a:r>
-              <a:rPr lang="en-US" dirty="0" smtClean="0"/>
-              <a:t>100% </a:t>
-            </a:r>
-            <a:r>
-              <a:rPr lang="en-US" dirty="0" smtClean="0"/>
-              <a:t>turnout, within the first 5 minutes, with pens!)</a:t>
+              <a:t>Opportunity Cell Meet (near 100% turnout, within the first 5 minutes, with pens!)</a:t>
             </a:r>
           </a:p>
           <a:p>

</xml_diff>